<commit_message>
update intro to patterns
</commit_message>
<xml_diff>
--- a/patterns/Iterator-in-Python.pptx
+++ b/patterns/Iterator-in-Python.pptx
@@ -256,7 +256,7 @@
           </a:bodyPr>
           <a:p>
             <a:pPr algn="r"/>
-            <a:fld id="{BCB19F77-FF55-4A3E-9F27-6DDA24F701DB}" type="slidenum">
+            <a:fld id="{9BBF5241-2A09-4EA2-9F1C-96D20BBFEE1E}" type="slidenum">
               <a:rPr b="0" lang="en-US" sz="1400" spc="-1" strike="noStrike">
                 <a:latin typeface="Times New Roman"/>
               </a:rPr>
@@ -300,7 +300,7 @@
         <p:spPr>
           <a:xfrm>
             <a:off x="1182600" y="768240"/>
-            <a:ext cx="4733280" cy="3836520"/>
+            <a:ext cx="4732920" cy="3836160"/>
           </a:xfrm>
           <a:custGeom>
             <a:avLst/>
@@ -354,7 +354,7 @@
         <p:spPr>
           <a:xfrm>
             <a:off x="946080" y="4861080"/>
-            <a:ext cx="5206320" cy="4604400"/>
+            <a:ext cx="5205960" cy="4604040"/>
           </a:xfrm>
           <a:custGeom>
             <a:avLst/>
@@ -429,7 +429,7 @@
         <p:spPr>
           <a:xfrm>
             <a:off x="992160" y="768240"/>
-            <a:ext cx="5104800" cy="3826800"/>
+            <a:ext cx="5104440" cy="3826440"/>
           </a:xfrm>
           <a:prstGeom prst="rect">
             <a:avLst/>
@@ -445,7 +445,7 @@
         <p:spPr>
           <a:xfrm>
             <a:off x="946080" y="4861080"/>
-            <a:ext cx="5196960" cy="4595040"/>
+            <a:ext cx="5196600" cy="4594680"/>
           </a:xfrm>
           <a:custGeom>
             <a:avLst/>
@@ -520,7 +520,7 @@
         <p:spPr>
           <a:xfrm>
             <a:off x="992160" y="768240"/>
-            <a:ext cx="5104800" cy="3826800"/>
+            <a:ext cx="5104440" cy="3826440"/>
           </a:xfrm>
           <a:prstGeom prst="rect">
             <a:avLst/>
@@ -536,7 +536,7 @@
         <p:spPr>
           <a:xfrm>
             <a:off x="946080" y="4861080"/>
-            <a:ext cx="5196960" cy="4595040"/>
+            <a:ext cx="5196600" cy="4594680"/>
           </a:xfrm>
           <a:custGeom>
             <a:avLst/>
@@ -611,7 +611,7 @@
         <p:spPr>
           <a:xfrm>
             <a:off x="992160" y="768240"/>
-            <a:ext cx="5104800" cy="3826800"/>
+            <a:ext cx="5104440" cy="3826440"/>
           </a:xfrm>
           <a:prstGeom prst="rect">
             <a:avLst/>
@@ -627,7 +627,7 @@
         <p:spPr>
           <a:xfrm>
             <a:off x="946080" y="4861080"/>
-            <a:ext cx="5196960" cy="4595040"/>
+            <a:ext cx="5196600" cy="4594680"/>
           </a:xfrm>
           <a:custGeom>
             <a:avLst/>
@@ -702,7 +702,7 @@
         <p:spPr>
           <a:xfrm>
             <a:off x="992160" y="768240"/>
-            <a:ext cx="5104800" cy="3826800"/>
+            <a:ext cx="5104440" cy="3826440"/>
           </a:xfrm>
           <a:prstGeom prst="rect">
             <a:avLst/>
@@ -718,7 +718,7 @@
         <p:spPr>
           <a:xfrm>
             <a:off x="946080" y="4861080"/>
-            <a:ext cx="5196960" cy="4595040"/>
+            <a:ext cx="5196600" cy="4594680"/>
           </a:xfrm>
           <a:custGeom>
             <a:avLst/>
@@ -793,7 +793,7 @@
         <p:spPr>
           <a:xfrm>
             <a:off x="992160" y="768240"/>
-            <a:ext cx="5114160" cy="3836520"/>
+            <a:ext cx="5113800" cy="3836160"/>
           </a:xfrm>
           <a:prstGeom prst="rect">
             <a:avLst/>
@@ -809,7 +809,7 @@
         <p:spPr>
           <a:xfrm>
             <a:off x="946080" y="4861080"/>
-            <a:ext cx="5206320" cy="4710960"/>
+            <a:ext cx="5205960" cy="4710600"/>
           </a:xfrm>
           <a:custGeom>
             <a:avLst/>
@@ -884,7 +884,7 @@
         <p:spPr>
           <a:xfrm>
             <a:off x="992160" y="768240"/>
-            <a:ext cx="5114160" cy="3836520"/>
+            <a:ext cx="5113800" cy="3836160"/>
           </a:xfrm>
           <a:prstGeom prst="rect">
             <a:avLst/>
@@ -900,7 +900,7 @@
         <p:spPr>
           <a:xfrm>
             <a:off x="946080" y="4861080"/>
-            <a:ext cx="5206320" cy="4710960"/>
+            <a:ext cx="5205960" cy="4710600"/>
           </a:xfrm>
           <a:custGeom>
             <a:avLst/>
@@ -975,7 +975,7 @@
         <p:spPr>
           <a:xfrm>
             <a:off x="992160" y="768240"/>
-            <a:ext cx="5104800" cy="3826800"/>
+            <a:ext cx="5104440" cy="3826440"/>
           </a:xfrm>
           <a:prstGeom prst="rect">
             <a:avLst/>
@@ -991,7 +991,7 @@
         <p:spPr>
           <a:xfrm>
             <a:off x="946080" y="4861080"/>
-            <a:ext cx="5196960" cy="4595040"/>
+            <a:ext cx="5196600" cy="4594680"/>
           </a:xfrm>
           <a:custGeom>
             <a:avLst/>
@@ -1066,7 +1066,7 @@
         <p:spPr>
           <a:xfrm>
             <a:off x="992160" y="768240"/>
-            <a:ext cx="5104800" cy="3826800"/>
+            <a:ext cx="5104440" cy="3826440"/>
           </a:xfrm>
           <a:prstGeom prst="rect">
             <a:avLst/>
@@ -1082,7 +1082,7 @@
         <p:spPr>
           <a:xfrm>
             <a:off x="946080" y="4861080"/>
-            <a:ext cx="5196960" cy="4595040"/>
+            <a:ext cx="5196600" cy="4594680"/>
           </a:xfrm>
           <a:custGeom>
             <a:avLst/>
@@ -1157,7 +1157,7 @@
         <p:spPr>
           <a:xfrm>
             <a:off x="992160" y="768240"/>
-            <a:ext cx="5104800" cy="3826800"/>
+            <a:ext cx="5104440" cy="3826440"/>
           </a:xfrm>
           <a:prstGeom prst="rect">
             <a:avLst/>
@@ -1173,7 +1173,7 @@
         <p:spPr>
           <a:xfrm>
             <a:off x="946080" y="4861080"/>
-            <a:ext cx="5196960" cy="4595040"/>
+            <a:ext cx="5196600" cy="4594680"/>
           </a:xfrm>
           <a:custGeom>
             <a:avLst/>
@@ -1248,7 +1248,7 @@
         <p:spPr>
           <a:xfrm>
             <a:off x="992160" y="768240"/>
-            <a:ext cx="5104800" cy="3826800"/>
+            <a:ext cx="5104440" cy="3826440"/>
           </a:xfrm>
           <a:prstGeom prst="rect">
             <a:avLst/>
@@ -1264,7 +1264,7 @@
         <p:spPr>
           <a:xfrm>
             <a:off x="946080" y="4861080"/>
-            <a:ext cx="5196960" cy="4595040"/>
+            <a:ext cx="5196600" cy="4594680"/>
           </a:xfrm>
           <a:custGeom>
             <a:avLst/>
@@ -5410,9 +5410,9 @@
         <p:grpSpPr>
           <a:xfrm>
             <a:off x="0" y="2438280"/>
-            <a:ext cx="8979840" cy="1023480"/>
+            <a:ext cx="8979480" cy="1023120"/>
             <a:chOff x="0" y="2438280"/>
-            <a:chExt cx="8979840" cy="1023480"/>
+            <a:chExt cx="8979480" cy="1023120"/>
           </a:xfrm>
         </p:grpSpPr>
         <p:grpSp>
@@ -5424,9 +5424,9 @@
           <p:grpSpPr>
             <a:xfrm>
               <a:off x="290520" y="2546280"/>
-              <a:ext cx="681480" cy="445320"/>
+              <a:ext cx="681120" cy="444960"/>
               <a:chOff x="290520" y="2546280"/>
-              <a:chExt cx="681480" cy="445320"/>
+              <a:chExt cx="681120" cy="444960"/>
             </a:xfrm>
           </p:grpSpPr>
           <p:sp>
@@ -5438,7 +5438,7 @@
             <p:spPr>
               <a:xfrm>
                 <a:off x="290520" y="2546280"/>
-                <a:ext cx="428760" cy="445320"/>
+                <a:ext cx="428400" cy="444960"/>
               </a:xfrm>
               <a:prstGeom prst="rect">
                 <a:avLst/>
@@ -5466,7 +5466,7 @@
             <p:spPr>
               <a:xfrm>
                 <a:off x="672120" y="2546280"/>
-                <a:ext cx="299880" cy="445320"/>
+                <a:ext cx="299520" cy="444960"/>
               </a:xfrm>
               <a:prstGeom prst="rect">
                 <a:avLst/>
@@ -5503,9 +5503,9 @@
           <p:grpSpPr>
             <a:xfrm>
               <a:off x="414360" y="2967120"/>
-              <a:ext cx="708840" cy="445320"/>
+              <a:ext cx="708480" cy="444960"/>
               <a:chOff x="414360" y="2967120"/>
-              <a:chExt cx="708840" cy="445320"/>
+              <a:chExt cx="708480" cy="444960"/>
             </a:xfrm>
           </p:grpSpPr>
           <p:sp>
@@ -5517,7 +5517,7 @@
             <p:spPr>
               <a:xfrm>
                 <a:off x="414360" y="2967120"/>
-                <a:ext cx="394560" cy="445320"/>
+                <a:ext cx="394200" cy="444960"/>
               </a:xfrm>
               <a:prstGeom prst="rect">
                 <a:avLst/>
@@ -5545,7 +5545,7 @@
             <p:spPr>
               <a:xfrm>
                 <a:off x="782640" y="2967120"/>
-                <a:ext cx="340560" cy="445320"/>
+                <a:ext cx="340200" cy="444960"/>
               </a:xfrm>
               <a:prstGeom prst="rect">
                 <a:avLst/>
@@ -5582,7 +5582,7 @@
           <p:spPr>
             <a:xfrm>
               <a:off x="0" y="2894040"/>
-              <a:ext cx="532800" cy="394560"/>
+              <a:ext cx="532440" cy="394200"/>
             </a:xfrm>
             <a:prstGeom prst="rect">
               <a:avLst/>
@@ -5618,7 +5618,7 @@
           <p:spPr>
             <a:xfrm>
               <a:off x="635040" y="2438280"/>
-              <a:ext cx="3960" cy="1023480"/>
+              <a:ext cx="3600" cy="1023120"/>
             </a:xfrm>
             <a:prstGeom prst="rect">
               <a:avLst/>
@@ -5645,8 +5645,8 @@
           </p:nvSpPr>
           <p:spPr>
             <a:xfrm flipV="1">
-              <a:off x="316080" y="3257280"/>
-              <a:ext cx="8663760" cy="28080"/>
+              <a:off x="316080" y="3256200"/>
+              <a:ext cx="8663400" cy="27720"/>
             </a:xfrm>
             <a:prstGeom prst="rect">
               <a:avLst/>
@@ -5686,8 +5686,8 @@
         </p:nvSpPr>
         <p:spPr>
           <a:xfrm>
-            <a:off x="610920" y="260280"/>
-            <a:ext cx="7892280" cy="835920"/>
+            <a:off x="457200" y="273600"/>
+            <a:ext cx="8229240" cy="1144800"/>
           </a:xfrm>
           <a:prstGeom prst="rect">
             <a:avLst/>
@@ -5698,13 +5698,14 @@
             <a:noAutofit/>
           </a:bodyPr>
           <a:p>
-            <a:r>
-              <a:rPr b="0" lang="en-US" sz="1800" spc="-1" strike="noStrike">
+            <a:pPr algn="ctr"/>
+            <a:r>
+              <a:rPr b="0" lang="en-US" sz="4400" spc="-1" strike="noStrike">
                 <a:latin typeface="Arial"/>
               </a:rPr>
               <a:t>Click to edit the title text format</a:t>
             </a:r>
-            <a:endParaRPr b="0" lang="en-US" sz="1800" spc="-1" strike="noStrike">
+            <a:endParaRPr b="0" lang="en-US" sz="4400" spc="-1" strike="noStrike">
               <a:latin typeface="Arial"/>
             </a:endParaRPr>
           </a:p>
@@ -5722,8 +5723,8 @@
         </p:nvSpPr>
         <p:spPr>
           <a:xfrm>
-            <a:off x="610920" y="1371240"/>
-            <a:ext cx="7892280" cy="4434840"/>
+            <a:off x="457200" y="1604520"/>
+            <a:ext cx="8229240" cy="3977280"/>
           </a:xfrm>
           <a:prstGeom prst="rect">
             <a:avLst/>
@@ -5746,12 +5747,12 @@
               <a:buChar char=""/>
             </a:pPr>
             <a:r>
-              <a:rPr b="0" lang="en-US" sz="1800" spc="-1" strike="noStrike">
+              <a:rPr b="0" lang="en-US" sz="3200" spc="-1" strike="noStrike">
                 <a:latin typeface="Arial"/>
               </a:rPr>
               <a:t>Click to edit the outline text format</a:t>
             </a:r>
-            <a:endParaRPr b="0" lang="en-US" sz="1800" spc="-1" strike="noStrike">
+            <a:endParaRPr b="0" lang="en-US" sz="3200" spc="-1" strike="noStrike">
               <a:latin typeface="Arial"/>
             </a:endParaRPr>
           </a:p>
@@ -5768,12 +5769,12 @@
               <a:buChar char=""/>
             </a:pPr>
             <a:r>
-              <a:rPr b="0" lang="en-US" sz="1800" spc="-1" strike="noStrike">
+              <a:rPr b="0" lang="en-US" sz="2800" spc="-1" strike="noStrike">
                 <a:latin typeface="Arial"/>
               </a:rPr>
               <a:t>Second Outline Level</a:t>
             </a:r>
-            <a:endParaRPr b="0" lang="en-US" sz="1800" spc="-1" strike="noStrike">
+            <a:endParaRPr b="0" lang="en-US" sz="2800" spc="-1" strike="noStrike">
               <a:latin typeface="Arial"/>
             </a:endParaRPr>
           </a:p>
@@ -5790,12 +5791,12 @@
               <a:buChar char=""/>
             </a:pPr>
             <a:r>
-              <a:rPr b="0" lang="en-US" sz="1800" spc="-1" strike="noStrike">
+              <a:rPr b="0" lang="en-US" sz="2400" spc="-1" strike="noStrike">
                 <a:latin typeface="Arial"/>
               </a:rPr>
               <a:t>Third Outline Level</a:t>
             </a:r>
-            <a:endParaRPr b="0" lang="en-US" sz="1800" spc="-1" strike="noStrike">
+            <a:endParaRPr b="0" lang="en-US" sz="2400" spc="-1" strike="noStrike">
               <a:latin typeface="Arial"/>
             </a:endParaRPr>
           </a:p>
@@ -5812,12 +5813,12 @@
               <a:buChar char=""/>
             </a:pPr>
             <a:r>
-              <a:rPr b="0" lang="en-US" sz="1800" spc="-1" strike="noStrike">
+              <a:rPr b="0" lang="en-US" sz="2000" spc="-1" strike="noStrike">
                 <a:latin typeface="Arial"/>
               </a:rPr>
               <a:t>Fourth Outline Level</a:t>
             </a:r>
-            <a:endParaRPr b="0" lang="en-US" sz="1800" spc="-1" strike="noStrike">
+            <a:endParaRPr b="0" lang="en-US" sz="2000" spc="-1" strike="noStrike">
               <a:latin typeface="Arial"/>
             </a:endParaRPr>
           </a:p>
@@ -5834,12 +5835,12 @@
               <a:buChar char=""/>
             </a:pPr>
             <a:r>
-              <a:rPr b="0" lang="en-US" sz="1800" spc="-1" strike="noStrike">
+              <a:rPr b="0" lang="en-US" sz="2000" spc="-1" strike="noStrike">
                 <a:latin typeface="Arial"/>
               </a:rPr>
               <a:t>Fifth Outline Level</a:t>
             </a:r>
-            <a:endParaRPr b="0" lang="en-US" sz="1800" spc="-1" strike="noStrike">
+            <a:endParaRPr b="0" lang="en-US" sz="2000" spc="-1" strike="noStrike">
               <a:latin typeface="Arial"/>
             </a:endParaRPr>
           </a:p>
@@ -5856,12 +5857,12 @@
               <a:buChar char=""/>
             </a:pPr>
             <a:r>
-              <a:rPr b="0" lang="en-US" sz="1800" spc="-1" strike="noStrike">
+              <a:rPr b="0" lang="en-US" sz="2000" spc="-1" strike="noStrike">
                 <a:latin typeface="Arial"/>
               </a:rPr>
               <a:t>Sixth Outline Level</a:t>
             </a:r>
-            <a:endParaRPr b="0" lang="en-US" sz="1800" spc="-1" strike="noStrike">
+            <a:endParaRPr b="0" lang="en-US" sz="2000" spc="-1" strike="noStrike">
               <a:latin typeface="Arial"/>
             </a:endParaRPr>
           </a:p>
@@ -5878,12 +5879,12 @@
               <a:buChar char=""/>
             </a:pPr>
             <a:r>
-              <a:rPr b="0" lang="en-US" sz="1800" spc="-1" strike="noStrike">
+              <a:rPr b="0" lang="en-US" sz="2000" spc="-1" strike="noStrike">
                 <a:latin typeface="Arial"/>
               </a:rPr>
               <a:t>Seventh Outline Level</a:t>
             </a:r>
-            <a:endParaRPr b="0" lang="en-US" sz="1800" spc="-1" strike="noStrike">
+            <a:endParaRPr b="0" lang="en-US" sz="2000" spc="-1" strike="noStrike">
               <a:latin typeface="Arial"/>
             </a:endParaRPr>
           </a:p>
@@ -5942,9 +5943,9 @@
         <p:grpSpPr>
           <a:xfrm>
             <a:off x="189000" y="368280"/>
-            <a:ext cx="8197200" cy="1023120"/>
+            <a:ext cx="8196840" cy="1022760"/>
             <a:chOff x="189000" y="368280"/>
-            <a:chExt cx="8197200" cy="1023120"/>
+            <a:chExt cx="8196840" cy="1022760"/>
           </a:xfrm>
         </p:grpSpPr>
         <p:sp>
@@ -5956,7 +5957,7 @@
           <p:spPr>
             <a:xfrm>
               <a:off x="507960" y="368280"/>
-              <a:ext cx="3960" cy="1023120"/>
+              <a:ext cx="3600" cy="1022760"/>
             </a:xfrm>
             <a:prstGeom prst="rect">
               <a:avLst/>
@@ -5984,7 +5985,7 @@
           <p:spPr>
             <a:xfrm>
               <a:off x="189000" y="1157400"/>
-              <a:ext cx="8197200" cy="3960"/>
+              <a:ext cx="8196840" cy="3600"/>
             </a:xfrm>
             <a:prstGeom prst="rect">
               <a:avLst/>
@@ -6281,9 +6282,9 @@
         <p:grpSpPr>
           <a:xfrm>
             <a:off x="189000" y="368280"/>
-            <a:ext cx="8197200" cy="1023120"/>
+            <a:ext cx="8196840" cy="1022760"/>
             <a:chOff x="189000" y="368280"/>
-            <a:chExt cx="8197200" cy="1023120"/>
+            <a:chExt cx="8196840" cy="1022760"/>
           </a:xfrm>
         </p:grpSpPr>
         <p:sp>
@@ -6295,7 +6296,7 @@
           <p:spPr>
             <a:xfrm>
               <a:off x="507960" y="368280"/>
-              <a:ext cx="3960" cy="1023120"/>
+              <a:ext cx="3600" cy="1022760"/>
             </a:xfrm>
             <a:prstGeom prst="rect">
               <a:avLst/>
@@ -6323,7 +6324,7 @@
           <p:spPr>
             <a:xfrm>
               <a:off x="189000" y="1157400"/>
-              <a:ext cx="8197200" cy="3960"/>
+              <a:ext cx="8196840" cy="3600"/>
             </a:xfrm>
             <a:prstGeom prst="rect">
               <a:avLst/>
@@ -6620,7 +6621,7 @@
         <p:spPr>
           <a:xfrm>
             <a:off x="990720" y="1676160"/>
-            <a:ext cx="7161840" cy="1461240"/>
+            <a:ext cx="7161480" cy="1460880"/>
           </a:xfrm>
           <a:prstGeom prst="rect">
             <a:avLst/>
@@ -6705,7 +6706,7 @@
         <p:spPr>
           <a:xfrm>
             <a:off x="1371600" y="3886200"/>
-            <a:ext cx="6400080" cy="1751760"/>
+            <a:ext cx="6399720" cy="1751400"/>
           </a:xfrm>
           <a:prstGeom prst="rect">
             <a:avLst/>
@@ -6724,14 +6725,14 @@
       </p:sp>
       <p:sp>
         <p:nvSpPr>
-          <p:cNvPr id="138" name="TextShape 3"/>
-          <p:cNvSpPr txBox="1"/>
+          <p:cNvPr id="138" name="CustomShape 3"/>
+          <p:cNvSpPr/>
           <p:nvPr/>
         </p:nvSpPr>
         <p:spPr>
           <a:xfrm>
             <a:off x="1371600" y="3705120"/>
-            <a:ext cx="6035040" cy="1506960"/>
+            <a:ext cx="6034680" cy="1506600"/>
           </a:xfrm>
           <a:prstGeom prst="rect">
             <a:avLst/>
@@ -6741,12 +6742,22 @@
             <a:noFill/>
           </a:ln>
         </p:spPr>
+        <p:style>
+          <a:lnRef idx="0"/>
+          <a:fillRef idx="0"/>
+          <a:effectRef idx="0"/>
+          <a:fontRef idx="minor"/>
+        </p:style>
         <p:txBody>
           <a:bodyPr lIns="90000" rIns="90000" tIns="45000" bIns="45000">
             <a:noAutofit/>
           </a:bodyPr>
           <a:p>
-            <a:pPr algn="ctr"/>
+            <a:pPr algn="ctr">
+              <a:lnSpc>
+                <a:spcPct val="100000"/>
+              </a:lnSpc>
+            </a:pPr>
             <a:r>
               <a:rPr b="0" lang="en-US" sz="2000" spc="-1" strike="noStrike">
                 <a:latin typeface="Arial"/>
@@ -6758,13 +6769,21 @@
             </a:endParaRPr>
           </a:p>
           <a:p>
-            <a:pPr algn="ctr"/>
+            <a:pPr algn="ctr">
+              <a:lnSpc>
+                <a:spcPct val="100000"/>
+              </a:lnSpc>
+            </a:pPr>
             <a:endParaRPr b="0" lang="en-US" sz="2000" spc="-1" strike="noStrike">
               <a:latin typeface="Arial"/>
             </a:endParaRPr>
           </a:p>
           <a:p>
-            <a:pPr algn="ctr"/>
+            <a:pPr algn="ctr">
+              <a:lnSpc>
+                <a:spcPct val="100000"/>
+              </a:lnSpc>
+            </a:pPr>
             <a:r>
               <a:rPr b="0" i="1" lang="en-US" sz="2000" spc="-1" strike="noStrike">
                 <a:latin typeface="Arial"/>
@@ -6823,7 +6842,7 @@
         <p:spPr>
           <a:xfrm>
             <a:off x="611280" y="259920"/>
-            <a:ext cx="7911360" cy="855000"/>
+            <a:ext cx="7911000" cy="854640"/>
           </a:xfrm>
           <a:prstGeom prst="rect">
             <a:avLst/>
@@ -6918,7 +6937,7 @@
         <p:spPr>
           <a:xfrm>
             <a:off x="5394240" y="2193840"/>
-            <a:ext cx="3382200" cy="1491480"/>
+            <a:ext cx="3381840" cy="1491120"/>
           </a:xfrm>
           <a:custGeom>
             <a:avLst/>
@@ -7219,7 +7238,7 @@
         <p:spPr>
           <a:xfrm>
             <a:off x="5394240" y="4572000"/>
-            <a:ext cx="3382200" cy="1553400"/>
+            <a:ext cx="3381840" cy="1553040"/>
           </a:xfrm>
           <a:custGeom>
             <a:avLst/>
@@ -7490,7 +7509,7 @@
         <p:spPr>
           <a:xfrm>
             <a:off x="457200" y="2193840"/>
-            <a:ext cx="3382200" cy="1491480"/>
+            <a:ext cx="3381840" cy="1491120"/>
           </a:xfrm>
           <a:custGeom>
             <a:avLst/>
@@ -7768,7 +7787,7 @@
         <p:spPr>
           <a:xfrm>
             <a:off x="457200" y="4572000"/>
-            <a:ext cx="3382200" cy="1553400"/>
+            <a:ext cx="3381840" cy="1553040"/>
           </a:xfrm>
           <a:custGeom>
             <a:avLst/>
@@ -8086,7 +8105,7 @@
         <p:spPr>
           <a:xfrm>
             <a:off x="3840120" y="2560680"/>
-            <a:ext cx="1553400" cy="454680"/>
+            <a:ext cx="1553040" cy="454320"/>
           </a:xfrm>
           <a:custGeom>
             <a:avLst/>
@@ -8194,7 +8213,7 @@
         <p:spPr>
           <a:xfrm>
             <a:off x="3840120" y="5030640"/>
-            <a:ext cx="1553400" cy="455040"/>
+            <a:ext cx="1553040" cy="454680"/>
           </a:xfrm>
           <a:custGeom>
             <a:avLst/>
@@ -8302,7 +8321,7 @@
         <p:spPr>
           <a:xfrm>
             <a:off x="549360" y="1463760"/>
-            <a:ext cx="8136720" cy="516600"/>
+            <a:ext cx="8136360" cy="516240"/>
           </a:xfrm>
           <a:custGeom>
             <a:avLst/>
@@ -8410,7 +8429,7 @@
         <p:spPr>
           <a:xfrm>
             <a:off x="-182520" y="2835360"/>
-            <a:ext cx="639000" cy="456480"/>
+            <a:ext cx="638640" cy="456120"/>
           </a:xfrm>
           <a:custGeom>
             <a:avLst/>
@@ -8472,7 +8491,7 @@
         <p:spPr>
           <a:xfrm>
             <a:off x="7132680" y="3933720"/>
-            <a:ext cx="1828080" cy="455040"/>
+            <a:ext cx="1827720" cy="454680"/>
           </a:xfrm>
           <a:custGeom>
             <a:avLst/>
@@ -8580,7 +8599,7 @@
         <p:spPr>
           <a:xfrm>
             <a:off x="2104920" y="3983040"/>
-            <a:ext cx="1828080" cy="455040"/>
+            <a:ext cx="1827720" cy="454680"/>
           </a:xfrm>
           <a:custGeom>
             <a:avLst/>
@@ -8688,9 +8707,9 @@
         <p:grpSpPr>
           <a:xfrm>
             <a:off x="1920960" y="3686040"/>
-            <a:ext cx="453240" cy="910800"/>
+            <a:ext cx="452880" cy="910800"/>
             <a:chOff x="1920960" y="3686040"/>
-            <a:chExt cx="453240" cy="910800"/>
+            <a:chExt cx="452880" cy="910800"/>
           </a:xfrm>
         </p:grpSpPr>
         <p:sp>
@@ -8702,7 +8721,7 @@
           <p:spPr>
             <a:xfrm>
               <a:off x="1920960" y="3686040"/>
-              <a:ext cx="453240" cy="276480"/>
+              <a:ext cx="452880" cy="276120"/>
             </a:xfrm>
             <a:custGeom>
               <a:avLst/>
@@ -8782,9 +8801,9 @@
         <p:grpSpPr>
           <a:xfrm>
             <a:off x="6765840" y="3686040"/>
-            <a:ext cx="453240" cy="910800"/>
+            <a:ext cx="452880" cy="910800"/>
             <a:chOff x="6765840" y="3686040"/>
-            <a:chExt cx="453240" cy="910800"/>
+            <a:chExt cx="452880" cy="910800"/>
           </a:xfrm>
         </p:grpSpPr>
         <p:sp>
@@ -8796,7 +8815,7 @@
           <p:spPr>
             <a:xfrm>
               <a:off x="6765840" y="3686040"/>
-              <a:ext cx="453240" cy="276480"/>
+              <a:ext cx="452880" cy="276120"/>
             </a:xfrm>
             <a:custGeom>
               <a:avLst/>
@@ -8845,7 +8864,7 @@
           </p:nvSpPr>
           <p:spPr>
             <a:xfrm flipV="1">
-              <a:off x="7013520" y="3962880"/>
+              <a:off x="7013160" y="3962880"/>
               <a:ext cx="0" cy="633960"/>
             </a:xfrm>
             <a:prstGeom prst="line">
@@ -8913,7 +8932,7 @@
         <p:spPr>
           <a:xfrm>
             <a:off x="611280" y="259920"/>
-            <a:ext cx="7911360" cy="855000"/>
+            <a:ext cx="7911000" cy="854640"/>
           </a:xfrm>
           <a:prstGeom prst="rect">
             <a:avLst/>
@@ -8998,7 +9017,7 @@
         <p:spPr>
           <a:xfrm>
             <a:off x="5394240" y="2193840"/>
-            <a:ext cx="3382200" cy="1491480"/>
+            <a:ext cx="3381840" cy="1491120"/>
           </a:xfrm>
           <a:custGeom>
             <a:avLst/>
@@ -9289,7 +9308,7 @@
         <p:spPr>
           <a:xfrm>
             <a:off x="5394240" y="4572000"/>
-            <a:ext cx="3382200" cy="1553400"/>
+            <a:ext cx="3381840" cy="1553040"/>
           </a:xfrm>
           <a:custGeom>
             <a:avLst/>
@@ -9560,7 +9579,7 @@
         <p:spPr>
           <a:xfrm>
             <a:off x="457200" y="2193840"/>
-            <a:ext cx="3382200" cy="1491480"/>
+            <a:ext cx="3381840" cy="1491120"/>
           </a:xfrm>
           <a:custGeom>
             <a:avLst/>
@@ -9838,7 +9857,7 @@
         <p:spPr>
           <a:xfrm>
             <a:off x="457200" y="4572000"/>
-            <a:ext cx="3382200" cy="1553400"/>
+            <a:ext cx="3381840" cy="1553040"/>
           </a:xfrm>
           <a:custGeom>
             <a:avLst/>
@@ -10156,7 +10175,7 @@
         <p:spPr>
           <a:xfrm>
             <a:off x="3840120" y="2560680"/>
-            <a:ext cx="1553400" cy="454680"/>
+            <a:ext cx="1553040" cy="454320"/>
           </a:xfrm>
           <a:custGeom>
             <a:avLst/>
@@ -10264,7 +10283,7 @@
         <p:spPr>
           <a:xfrm>
             <a:off x="3840120" y="5030640"/>
-            <a:ext cx="1553400" cy="455040"/>
+            <a:ext cx="1553040" cy="454680"/>
           </a:xfrm>
           <a:custGeom>
             <a:avLst/>
@@ -10372,7 +10391,7 @@
         <p:spPr>
           <a:xfrm>
             <a:off x="549360" y="1284120"/>
-            <a:ext cx="8136720" cy="516960"/>
+            <a:ext cx="8136360" cy="516600"/>
           </a:xfrm>
           <a:custGeom>
             <a:avLst/>
@@ -10520,7 +10539,7 @@
         <p:spPr>
           <a:xfrm>
             <a:off x="6737400" y="3862440"/>
-            <a:ext cx="1828080" cy="454680"/>
+            <a:ext cx="1827720" cy="454320"/>
           </a:xfrm>
           <a:custGeom>
             <a:avLst/>
@@ -10628,7 +10647,7 @@
         <p:spPr>
           <a:xfrm>
             <a:off x="1889280" y="3875040"/>
-            <a:ext cx="1828080" cy="455040"/>
+            <a:ext cx="1827720" cy="454680"/>
           </a:xfrm>
           <a:custGeom>
             <a:avLst/>
@@ -10736,9 +10755,9 @@
         <p:grpSpPr>
           <a:xfrm>
             <a:off x="1920960" y="3657600"/>
-            <a:ext cx="453240" cy="910800"/>
+            <a:ext cx="452880" cy="910800"/>
             <a:chOff x="1920960" y="3657600"/>
-            <a:chExt cx="453240" cy="910800"/>
+            <a:chExt cx="452880" cy="910800"/>
           </a:xfrm>
         </p:grpSpPr>
         <p:sp>
@@ -10750,7 +10769,7 @@
           <p:spPr>
             <a:xfrm>
               <a:off x="1920960" y="3657600"/>
-              <a:ext cx="453240" cy="276480"/>
+              <a:ext cx="452880" cy="276120"/>
             </a:xfrm>
             <a:custGeom>
               <a:avLst/>
@@ -10830,9 +10849,9 @@
         <p:grpSpPr>
           <a:xfrm>
             <a:off x="6765840" y="3686040"/>
-            <a:ext cx="453240" cy="910800"/>
+            <a:ext cx="452880" cy="910800"/>
             <a:chOff x="6765840" y="3686040"/>
-            <a:chExt cx="453240" cy="910800"/>
+            <a:chExt cx="452880" cy="910800"/>
           </a:xfrm>
         </p:grpSpPr>
         <p:sp>
@@ -10844,7 +10863,7 @@
           <p:spPr>
             <a:xfrm>
               <a:off x="6765840" y="3686040"/>
-              <a:ext cx="453240" cy="276480"/>
+              <a:ext cx="452880" cy="276120"/>
             </a:xfrm>
             <a:custGeom>
               <a:avLst/>
@@ -10893,7 +10912,7 @@
           </p:nvSpPr>
           <p:spPr>
             <a:xfrm flipV="1">
-              <a:off x="7013520" y="3962880"/>
+              <a:off x="7013160" y="3962880"/>
               <a:ext cx="0" cy="633960"/>
             </a:xfrm>
             <a:prstGeom prst="line">
@@ -10961,7 +10980,7 @@
         <p:spPr>
           <a:xfrm>
             <a:off x="611280" y="259920"/>
-            <a:ext cx="7896960" cy="840600"/>
+            <a:ext cx="7896600" cy="840240"/>
           </a:xfrm>
           <a:prstGeom prst="rect">
             <a:avLst/>
@@ -11066,7 +11085,7 @@
         <p:spPr>
           <a:xfrm>
             <a:off x="365040" y="1371240"/>
-            <a:ext cx="8321040" cy="5211000"/>
+            <a:ext cx="8320680" cy="5210640"/>
           </a:xfrm>
           <a:prstGeom prst="rect">
             <a:avLst/>
@@ -11185,7 +11204,7 @@
             </a:endParaRPr>
           </a:p>
           <a:p>
-            <a:pPr marL="342720" indent="-337320">
+            <a:pPr marL="342720" indent="-336960">
               <a:lnSpc>
                 <a:spcPct val="100000"/>
               </a:lnSpc>
@@ -11211,7 +11230,7 @@
             </a:endParaRPr>
           </a:p>
           <a:p>
-            <a:pPr marL="742680" indent="-280080">
+            <a:pPr marL="742680" indent="-279720">
               <a:lnSpc>
                 <a:spcPct val="100000"/>
               </a:lnSpc>
@@ -11257,7 +11276,7 @@
             </a:endParaRPr>
           </a:p>
           <a:p>
-            <a:pPr marL="342720" indent="-337320">
+            <a:pPr marL="342720" indent="-336960">
               <a:lnSpc>
                 <a:spcPct val="100000"/>
               </a:lnSpc>
@@ -11283,7 +11302,7 @@
             </a:endParaRPr>
           </a:p>
           <a:p>
-            <a:pPr marL="742680" indent="-280080">
+            <a:pPr marL="742680" indent="-279720">
               <a:lnSpc>
                 <a:spcPct val="100000"/>
               </a:lnSpc>
@@ -11329,7 +11348,7 @@
             </a:endParaRPr>
           </a:p>
           <a:p>
-            <a:pPr marL="342720" indent="-337320">
+            <a:pPr marL="342720" indent="-336960">
               <a:lnSpc>
                 <a:spcPct val="100000"/>
               </a:lnSpc>
@@ -11355,7 +11374,7 @@
             </a:endParaRPr>
           </a:p>
           <a:p>
-            <a:pPr marL="742680" indent="-280080">
+            <a:pPr marL="742680" indent="-279720">
               <a:lnSpc>
                 <a:spcPct val="100000"/>
               </a:lnSpc>
@@ -11411,7 +11430,7 @@
             </a:endParaRPr>
           </a:p>
           <a:p>
-            <a:pPr marL="342720" indent="-337320">
+            <a:pPr marL="342720" indent="-336960">
               <a:lnSpc>
                 <a:spcPct val="100000"/>
               </a:lnSpc>
@@ -11437,7 +11456,7 @@
             </a:endParaRPr>
           </a:p>
           <a:p>
-            <a:pPr marL="742680" indent="-280080">
+            <a:pPr marL="742680" indent="-279720">
               <a:lnSpc>
                 <a:spcPct val="100000"/>
               </a:lnSpc>
@@ -11590,7 +11609,7 @@
         <p:spPr>
           <a:xfrm>
             <a:off x="611280" y="259920"/>
-            <a:ext cx="7896960" cy="840600"/>
+            <a:ext cx="7896600" cy="840240"/>
           </a:xfrm>
           <a:prstGeom prst="rect">
             <a:avLst/>
@@ -11675,7 +11694,7 @@
         <p:spPr>
           <a:xfrm>
             <a:off x="610920" y="1371240"/>
-            <a:ext cx="8349480" cy="5303160"/>
+            <a:ext cx="8349120" cy="5302800"/>
           </a:xfrm>
           <a:prstGeom prst="rect">
             <a:avLst/>
@@ -11696,7 +11715,7 @@
             <a:normAutofit/>
           </a:bodyPr>
           <a:p>
-            <a:pPr marL="342720" indent="-337320">
+            <a:pPr marL="342720" indent="-336960">
               <a:lnSpc>
                 <a:spcPct val="100000"/>
               </a:lnSpc>
@@ -11722,7 +11741,7 @@
             </a:endParaRPr>
           </a:p>
           <a:p>
-            <a:pPr marL="342720" indent="-337320">
+            <a:pPr marL="342720" indent="-336960">
               <a:lnSpc>
                 <a:spcPct val="100000"/>
               </a:lnSpc>
@@ -11748,7 +11767,7 @@
             </a:endParaRPr>
           </a:p>
           <a:p>
-            <a:pPr marL="342720" indent="-337320">
+            <a:pPr marL="342720" indent="-336960">
               <a:lnSpc>
                 <a:spcPct val="100000"/>
               </a:lnSpc>
@@ -11784,7 +11803,7 @@
             </a:endParaRPr>
           </a:p>
           <a:p>
-            <a:pPr marL="342720" indent="-337320">
+            <a:pPr marL="342720" indent="-336960">
               <a:lnSpc>
                 <a:spcPct val="100000"/>
               </a:lnSpc>
@@ -11820,7 +11839,7 @@
             </a:endParaRPr>
           </a:p>
           <a:p>
-            <a:pPr marL="342720" indent="-337320">
+            <a:pPr marL="342720" indent="-336960">
               <a:lnSpc>
                 <a:spcPct val="100000"/>
               </a:lnSpc>
@@ -11866,7 +11885,7 @@
             </a:endParaRPr>
           </a:p>
           <a:p>
-            <a:pPr marL="342720" indent="-337320">
+            <a:pPr marL="342720" indent="-336960">
               <a:lnSpc>
                 <a:spcPct val="100000"/>
               </a:lnSpc>
@@ -11892,7 +11911,7 @@
             </a:endParaRPr>
           </a:p>
           <a:p>
-            <a:pPr marL="342720" indent="-337320">
+            <a:pPr marL="342720" indent="-336960">
               <a:lnSpc>
                 <a:spcPct val="100000"/>
               </a:lnSpc>
@@ -11918,7 +11937,7 @@
             </a:endParaRPr>
           </a:p>
           <a:p>
-            <a:pPr marL="342720" indent="-337320">
+            <a:pPr marL="342720" indent="-336960">
               <a:lnSpc>
                 <a:spcPct val="100000"/>
               </a:lnSpc>
@@ -11981,7 +12000,7 @@
         <p:spPr>
           <a:xfrm>
             <a:off x="611280" y="259920"/>
-            <a:ext cx="7896960" cy="840600"/>
+            <a:ext cx="7896600" cy="840240"/>
           </a:xfrm>
           <a:prstGeom prst="rect">
             <a:avLst/>
@@ -12086,7 +12105,7 @@
         <p:spPr>
           <a:xfrm>
             <a:off x="610920" y="1371240"/>
-            <a:ext cx="8349480" cy="5303160"/>
+            <a:ext cx="8349120" cy="5302800"/>
           </a:xfrm>
           <a:prstGeom prst="rect">
             <a:avLst/>
@@ -12107,7 +12126,7 @@
             <a:normAutofit/>
           </a:bodyPr>
           <a:p>
-            <a:pPr marL="342720" indent="-337320">
+            <a:pPr marL="342720" indent="-336960">
               <a:lnSpc>
                 <a:spcPct val="100000"/>
               </a:lnSpc>
@@ -12123,7 +12142,7 @@
             </a:endParaRPr>
           </a:p>
           <a:p>
-            <a:pPr marL="342720" indent="-337320">
+            <a:pPr marL="342720" indent="-336960">
               <a:lnSpc>
                 <a:spcPct val="100000"/>
               </a:lnSpc>
@@ -12149,7 +12168,7 @@
         <p:spPr>
           <a:xfrm>
             <a:off x="610920" y="2286000"/>
-            <a:ext cx="7954920" cy="4036680"/>
+            <a:ext cx="7954560" cy="4036320"/>
           </a:xfrm>
           <a:prstGeom prst="rect">
             <a:avLst/>
@@ -12177,7 +12196,11 @@
             </a:pPr>
             <a:r>
               <a:rPr b="0" lang="en-US" sz="2800" spc="-1" strike="noStrike">
+                <a:solidFill>
+                  <a:srgbClr val="000000"/>
+                </a:solidFill>
                 <a:latin typeface="Arial"/>
+                <a:ea typeface="DejaVu Sans"/>
               </a:rPr>
               <a:t>You can check you answer:</a:t>
             </a:r>
@@ -12203,31 +12226,51 @@
             </a:pPr>
             <a:r>
               <a:rPr b="0" lang="en-US" sz="2800" spc="-1" strike="noStrike">
+                <a:solidFill>
+                  <a:srgbClr val="000000"/>
+                </a:solidFill>
                 <a:latin typeface="Arial"/>
+                <a:ea typeface="DejaVu Sans"/>
               </a:rPr>
               <a:t>If </a:t>
             </a:r>
             <a:r>
               <a:rPr b="0" lang="en-US" sz="2800" spc="-1" strike="noStrike">
+                <a:solidFill>
+                  <a:srgbClr val="000000"/>
+                </a:solidFill>
                 <a:latin typeface="Courier New"/>
+                <a:ea typeface="DejaVu Sans"/>
               </a:rPr>
               <a:t>foo</a:t>
             </a:r>
             <a:r>
               <a:rPr b="0" lang="en-US" sz="2800" spc="-1" strike="noStrike">
+                <a:solidFill>
+                  <a:srgbClr val="000000"/>
+                </a:solidFill>
                 <a:latin typeface="Arial"/>
+                <a:ea typeface="DejaVu Sans"/>
               </a:rPr>
               <a:t> is </a:t>
             </a:r>
             <a:r>
               <a:rPr b="0" i="1" lang="en-US" sz="2800" spc="-1" strike="noStrike">
+                <a:solidFill>
+                  <a:srgbClr val="000000"/>
+                </a:solidFill>
                 <a:latin typeface="Arial"/>
+                <a:ea typeface="DejaVu Sans"/>
               </a:rPr>
               <a:t>Iterable</a:t>
             </a:r>
             <a:r>
               <a:rPr b="0" lang="en-US" sz="2800" spc="-1" strike="noStrike">
+                <a:solidFill>
+                  <a:srgbClr val="000000"/>
+                </a:solidFill>
                 <a:latin typeface="Arial"/>
+                <a:ea typeface="DejaVu Sans"/>
               </a:rPr>
               <a:t> then:</a:t>
             </a:r>
@@ -12243,13 +12286,21 @@
             </a:pPr>
             <a:r>
               <a:rPr b="0" lang="en-US" sz="2800" spc="-1" strike="noStrike">
+                <a:solidFill>
+                  <a:srgbClr val="000000"/>
+                </a:solidFill>
                 <a:latin typeface="Courier New"/>
+                <a:ea typeface="DejaVu Sans"/>
               </a:rPr>
               <a:t>&gt;&gt;&gt; </a:t>
             </a:r>
             <a:r>
               <a:rPr b="1" lang="en-US" sz="2800" spc="-1" strike="noStrike">
+                <a:solidFill>
+                  <a:srgbClr val="000000"/>
+                </a:solidFill>
                 <a:latin typeface="Courier New"/>
+                <a:ea typeface="DejaVu Sans"/>
               </a:rPr>
               <a:t>isinstance(foo, Iterable)</a:t>
             </a:r>
@@ -12265,7 +12316,11 @@
             </a:pPr>
             <a:r>
               <a:rPr b="0" lang="en-US" sz="2800" spc="-1" strike="noStrike">
+                <a:solidFill>
+                  <a:srgbClr val="000000"/>
+                </a:solidFill>
                 <a:latin typeface="Courier New"/>
+                <a:ea typeface="DejaVu Sans"/>
               </a:rPr>
               <a:t>True</a:t>
             </a:r>
@@ -12281,13 +12336,21 @@
             </a:pPr>
             <a:r>
               <a:rPr b="0" lang="en-US" sz="2800" spc="-1" strike="noStrike">
+                <a:solidFill>
+                  <a:srgbClr val="000000"/>
+                </a:solidFill>
                 <a:latin typeface="Courier New"/>
+                <a:ea typeface="DejaVu Sans"/>
               </a:rPr>
               <a:t>&gt;&gt;&gt; </a:t>
             </a:r>
             <a:r>
               <a:rPr b="1" lang="en-US" sz="2800" spc="-1" strike="noStrike">
+                <a:solidFill>
+                  <a:srgbClr val="000000"/>
+                </a:solidFill>
                 <a:latin typeface="Courier New"/>
+                <a:ea typeface="DejaVu Sans"/>
               </a:rPr>
               <a:t>it = iter(foo)</a:t>
             </a:r>
@@ -12303,13 +12366,21 @@
             </a:pPr>
             <a:r>
               <a:rPr b="0" lang="en-US" sz="2800" spc="-1" strike="noStrike">
+                <a:solidFill>
+                  <a:srgbClr val="000000"/>
+                </a:solidFill>
                 <a:latin typeface="Courier New"/>
+                <a:ea typeface="DejaVu Sans"/>
               </a:rPr>
               <a:t>&gt;&gt;&gt; </a:t>
             </a:r>
             <a:r>
               <a:rPr b="1" lang="en-US" sz="2800" spc="-1" strike="noStrike">
+                <a:solidFill>
+                  <a:srgbClr val="000000"/>
+                </a:solidFill>
                 <a:latin typeface="Courier New"/>
+                <a:ea typeface="DejaVu Sans"/>
               </a:rPr>
               <a:t>next(it)</a:t>
             </a:r>
@@ -12325,19 +12396,31 @@
             </a:pPr>
             <a:r>
               <a:rPr b="0" lang="en-US" sz="2800" spc="-1" strike="noStrike">
+                <a:solidFill>
+                  <a:srgbClr val="000000"/>
+                </a:solidFill>
                 <a:latin typeface="Arial"/>
+                <a:ea typeface="DejaVu Sans"/>
               </a:rPr>
               <a:t> </a:t>
             </a:r>
             <a:r>
               <a:rPr b="0" i="1" lang="en-US" sz="2800" spc="-1" strike="noStrike">
+                <a:solidFill>
+                  <a:srgbClr val="000000"/>
+                </a:solidFill>
                 <a:latin typeface="Arial"/>
+                <a:ea typeface="DejaVu Sans"/>
               </a:rPr>
               <a:t>should return first element of </a:t>
             </a:r>
             <a:r>
               <a:rPr b="0" i="1" lang="en-US" sz="2800" spc="-1" strike="noStrike">
+                <a:solidFill>
+                  <a:srgbClr val="000000"/>
+                </a:solidFill>
                 <a:latin typeface="Courier New"/>
+                <a:ea typeface="DejaVu Sans"/>
               </a:rPr>
               <a:t>foo</a:t>
             </a:r>
@@ -12403,7 +12486,7 @@
         <p:spPr>
           <a:xfrm>
             <a:off x="611280" y="259920"/>
-            <a:ext cx="7911360" cy="855000"/>
+            <a:ext cx="7911000" cy="854640"/>
           </a:xfrm>
           <a:prstGeom prst="rect">
             <a:avLst/>
@@ -12488,7 +12571,7 @@
         <p:spPr>
           <a:xfrm>
             <a:off x="549360" y="1284120"/>
-            <a:ext cx="8136720" cy="516960"/>
+            <a:ext cx="8136360" cy="516600"/>
           </a:xfrm>
           <a:custGeom>
             <a:avLst/>
@@ -12680,7 +12763,7 @@
         <p:spPr>
           <a:xfrm>
             <a:off x="822240" y="1990800"/>
-            <a:ext cx="2925000" cy="4096440"/>
+            <a:ext cx="2924640" cy="4096080"/>
           </a:xfrm>
           <a:prstGeom prst="rect">
             <a:avLst/>
@@ -12699,7 +12782,7 @@
         <p:spPr>
           <a:xfrm>
             <a:off x="4114800" y="4479840"/>
-            <a:ext cx="4388760" cy="821520"/>
+            <a:ext cx="4388400" cy="821160"/>
           </a:xfrm>
           <a:custGeom>
             <a:avLst/>
@@ -13006,7 +13089,7 @@
         <p:spPr>
           <a:xfrm>
             <a:off x="611280" y="259920"/>
-            <a:ext cx="7911360" cy="855000"/>
+            <a:ext cx="7911000" cy="854640"/>
           </a:xfrm>
           <a:prstGeom prst="rect">
             <a:avLst/>
@@ -13091,7 +13174,7 @@
         <p:spPr>
           <a:xfrm>
             <a:off x="5394240" y="2193840"/>
-            <a:ext cx="3382200" cy="1491480"/>
+            <a:ext cx="3381840" cy="1491120"/>
           </a:xfrm>
           <a:custGeom>
             <a:avLst/>
@@ -13382,7 +13465,7 @@
         <p:spPr>
           <a:xfrm>
             <a:off x="5394240" y="4572000"/>
-            <a:ext cx="3382200" cy="1553400"/>
+            <a:ext cx="3381840" cy="1553040"/>
           </a:xfrm>
           <a:custGeom>
             <a:avLst/>
@@ -13653,7 +13736,7 @@
         <p:spPr>
           <a:xfrm>
             <a:off x="457200" y="2193840"/>
-            <a:ext cx="3382200" cy="1491480"/>
+            <a:ext cx="3381840" cy="1491120"/>
           </a:xfrm>
           <a:custGeom>
             <a:avLst/>
@@ -13931,7 +14014,7 @@
         <p:spPr>
           <a:xfrm>
             <a:off x="457200" y="4572000"/>
-            <a:ext cx="3382200" cy="1553400"/>
+            <a:ext cx="3381840" cy="1553040"/>
           </a:xfrm>
           <a:custGeom>
             <a:avLst/>
@@ -14249,7 +14332,7 @@
         <p:spPr>
           <a:xfrm>
             <a:off x="3840120" y="2560680"/>
-            <a:ext cx="1553400" cy="454680"/>
+            <a:ext cx="1553040" cy="454320"/>
           </a:xfrm>
           <a:custGeom>
             <a:avLst/>
@@ -14357,7 +14440,7 @@
         <p:spPr>
           <a:xfrm>
             <a:off x="3840120" y="5030640"/>
-            <a:ext cx="1553400" cy="455040"/>
+            <a:ext cx="1553040" cy="454680"/>
           </a:xfrm>
           <a:custGeom>
             <a:avLst/>
@@ -14465,7 +14548,7 @@
         <p:spPr>
           <a:xfrm>
             <a:off x="549360" y="1284120"/>
-            <a:ext cx="8136720" cy="516960"/>
+            <a:ext cx="8136360" cy="516600"/>
           </a:xfrm>
           <a:custGeom>
             <a:avLst/>
@@ -14613,7 +14696,7 @@
         <p:spPr>
           <a:xfrm>
             <a:off x="6737400" y="3862440"/>
-            <a:ext cx="1828080" cy="454680"/>
+            <a:ext cx="1827720" cy="454320"/>
           </a:xfrm>
           <a:custGeom>
             <a:avLst/>
@@ -14721,7 +14804,7 @@
         <p:spPr>
           <a:xfrm>
             <a:off x="1889280" y="3875040"/>
-            <a:ext cx="1828080" cy="455040"/>
+            <a:ext cx="1827720" cy="454680"/>
           </a:xfrm>
           <a:custGeom>
             <a:avLst/>
@@ -14829,9 +14912,9 @@
         <p:grpSpPr>
           <a:xfrm>
             <a:off x="1920960" y="3657600"/>
-            <a:ext cx="453240" cy="910800"/>
+            <a:ext cx="452880" cy="910800"/>
             <a:chOff x="1920960" y="3657600"/>
-            <a:chExt cx="453240" cy="910800"/>
+            <a:chExt cx="452880" cy="910800"/>
           </a:xfrm>
         </p:grpSpPr>
         <p:sp>
@@ -14843,7 +14926,7 @@
           <p:spPr>
             <a:xfrm>
               <a:off x="1920960" y="3657600"/>
-              <a:ext cx="453240" cy="276480"/>
+              <a:ext cx="452880" cy="276120"/>
             </a:xfrm>
             <a:custGeom>
               <a:avLst/>
@@ -14923,9 +15006,9 @@
         <p:grpSpPr>
           <a:xfrm>
             <a:off x="6765840" y="3686040"/>
-            <a:ext cx="453240" cy="910800"/>
+            <a:ext cx="452880" cy="910800"/>
             <a:chOff x="6765840" y="3686040"/>
-            <a:chExt cx="453240" cy="910800"/>
+            <a:chExt cx="452880" cy="910800"/>
           </a:xfrm>
         </p:grpSpPr>
         <p:sp>
@@ -14937,7 +15020,7 @@
           <p:spPr>
             <a:xfrm>
               <a:off x="6765840" y="3686040"/>
-              <a:ext cx="453240" cy="276480"/>
+              <a:ext cx="452880" cy="276120"/>
             </a:xfrm>
             <a:custGeom>
               <a:avLst/>
@@ -14986,7 +15069,7 @@
           </p:nvSpPr>
           <p:spPr>
             <a:xfrm flipV="1">
-              <a:off x="7013520" y="3962880"/>
+              <a:off x="7013160" y="3962880"/>
               <a:ext cx="0" cy="633960"/>
             </a:xfrm>
             <a:prstGeom prst="line">
@@ -15017,7 +15100,7 @@
         <p:spPr>
           <a:xfrm>
             <a:off x="548640" y="1763640"/>
-            <a:ext cx="3108600" cy="429840"/>
+            <a:ext cx="3108240" cy="429480"/>
           </a:xfrm>
           <a:prstGeom prst="rect">
             <a:avLst/>
@@ -15049,6 +15132,7 @@
                   <a:srgbClr val="000080"/>
                 </a:solidFill>
                 <a:latin typeface="Arial"/>
+                <a:ea typeface="DejaVu Sans"/>
               </a:rPr>
               <a:t>FACTORY</a:t>
             </a:r>
@@ -15067,7 +15151,7 @@
         <p:spPr>
           <a:xfrm>
             <a:off x="5486400" y="1737360"/>
-            <a:ext cx="3108600" cy="429840"/>
+            <a:ext cx="3108240" cy="429480"/>
           </a:xfrm>
           <a:prstGeom prst="rect">
             <a:avLst/>
@@ -15099,6 +15183,7 @@
                   <a:srgbClr val="000080"/>
                 </a:solidFill>
                 <a:latin typeface="Arial"/>
+                <a:ea typeface="DejaVu Sans"/>
               </a:rPr>
               <a:t>PRODUCT</a:t>
             </a:r>
@@ -15154,7 +15239,7 @@
         <p:spPr>
           <a:xfrm>
             <a:off x="611280" y="259920"/>
-            <a:ext cx="7920720" cy="864360"/>
+            <a:ext cx="7920360" cy="864000"/>
           </a:xfrm>
           <a:prstGeom prst="rect">
             <a:avLst/>
@@ -15239,7 +15324,7 @@
         <p:spPr>
           <a:xfrm>
             <a:off x="611280" y="1371240"/>
-            <a:ext cx="7920720" cy="4963320"/>
+            <a:ext cx="7920360" cy="4962960"/>
           </a:xfrm>
           <a:prstGeom prst="rect">
             <a:avLst/>
@@ -15257,10 +15342,10 @@
         </p:style>
         <p:txBody>
           <a:bodyPr lIns="90000" rIns="90000" tIns="46800" bIns="46800">
-            <a:normAutofit/>
+            <a:normAutofit fontScale="97000"/>
           </a:bodyPr>
           <a:p>
-            <a:pPr marL="342720" indent="-315360">
+            <a:pPr marL="342720" indent="-315000">
               <a:lnSpc>
                 <a:spcPct val="100000"/>
               </a:lnSpc>
@@ -15289,7 +15374,7 @@
             </a:endParaRPr>
           </a:p>
           <a:p>
-            <a:pPr marL="342720" indent="-315360">
+            <a:pPr marL="342720" indent="-315000">
               <a:lnSpc>
                 <a:spcPct val="100000"/>
               </a:lnSpc>
@@ -15328,7 +15413,7 @@
             </a:endParaRPr>
           </a:p>
           <a:p>
-            <a:pPr marL="342720" indent="-315360" algn="ctr">
+            <a:pPr marL="342720" indent="-315000" algn="ctr">
               <a:lnSpc>
                 <a:spcPct val="100000"/>
               </a:lnSpc>
@@ -15357,7 +15442,7 @@
             </a:endParaRPr>
           </a:p>
           <a:p>
-            <a:pPr marL="342720" indent="-315360">
+            <a:pPr marL="342720" indent="-315000">
               <a:lnSpc>
                 <a:spcPct val="100000"/>
               </a:lnSpc>
@@ -15386,7 +15471,7 @@
             </a:endParaRPr>
           </a:p>
           <a:p>
-            <a:pPr marL="342720" indent="-315360">
+            <a:pPr marL="342720" indent="-315000">
               <a:lnSpc>
                 <a:spcPct val="100000"/>
               </a:lnSpc>
@@ -15436,7 +15521,145 @@
             </a:endParaRPr>
           </a:p>
           <a:p>
-            <a:pPr marL="342720" indent="-315360">
+            <a:pPr marL="342720" indent="-315000">
+              <a:lnSpc>
+                <a:spcPct val="100000"/>
+              </a:lnSpc>
+              <a:tabLst>
+                <a:tab algn="l" pos="0"/>
+              </a:tabLst>
+            </a:pPr>
+            <a:r>
+              <a:rPr b="0" lang="en-US" sz="2400" spc="-1" strike="noStrike">
+                <a:solidFill>
+                  <a:srgbClr val="000000"/>
+                </a:solidFill>
+                <a:latin typeface="Arial"/>
+                <a:ea typeface="DejaVu Sans"/>
+              </a:rPr>
+              <a:t>list</a:t>
+            </a:r>
+            <a:endParaRPr b="0" lang="en-US" sz="2400" spc="-1" strike="noStrike">
+              <a:latin typeface="Arial"/>
+            </a:endParaRPr>
+          </a:p>
+          <a:p>
+            <a:pPr marL="342720" indent="-315000">
+              <a:lnSpc>
+                <a:spcPct val="100000"/>
+              </a:lnSpc>
+              <a:tabLst>
+                <a:tab algn="l" pos="0"/>
+              </a:tabLst>
+            </a:pPr>
+            <a:r>
+              <a:rPr b="0" lang="en-US" sz="2400" spc="-1" strike="noStrike">
+                <a:solidFill>
+                  <a:srgbClr val="000000"/>
+                </a:solidFill>
+                <a:latin typeface="Arial"/>
+                <a:ea typeface="DejaVu Sans"/>
+              </a:rPr>
+              <a:t>dict</a:t>
+            </a:r>
+            <a:endParaRPr b="0" lang="en-US" sz="2400" spc="-1" strike="noStrike">
+              <a:latin typeface="Arial"/>
+            </a:endParaRPr>
+          </a:p>
+          <a:p>
+            <a:pPr marL="342720" indent="-315000">
+              <a:lnSpc>
+                <a:spcPct val="100000"/>
+              </a:lnSpc>
+              <a:tabLst>
+                <a:tab algn="l" pos="0"/>
+              </a:tabLst>
+            </a:pPr>
+            <a:r>
+              <a:rPr b="0" lang="en-US" sz="2400" spc="-1" strike="noStrike">
+                <a:solidFill>
+                  <a:srgbClr val="000000"/>
+                </a:solidFill>
+                <a:latin typeface="Arial"/>
+                <a:ea typeface="DejaVu Sans"/>
+              </a:rPr>
+              <a:t>set</a:t>
+            </a:r>
+            <a:endParaRPr b="0" lang="en-US" sz="2400" spc="-1" strike="noStrike">
+              <a:latin typeface="Arial"/>
+            </a:endParaRPr>
+          </a:p>
+          <a:p>
+            <a:pPr marL="342720" indent="-315000">
+              <a:lnSpc>
+                <a:spcPct val="100000"/>
+              </a:lnSpc>
+              <a:tabLst>
+                <a:tab algn="l" pos="0"/>
+              </a:tabLst>
+            </a:pPr>
+            <a:r>
+              <a:rPr b="0" lang="en-US" sz="2400" spc="-1" strike="noStrike">
+                <a:solidFill>
+                  <a:srgbClr val="000000"/>
+                </a:solidFill>
+                <a:latin typeface="Arial"/>
+                <a:ea typeface="DejaVu Sans"/>
+              </a:rPr>
+              <a:t>tuple</a:t>
+            </a:r>
+            <a:endParaRPr b="0" lang="en-US" sz="2400" spc="-1" strike="noStrike">
+              <a:latin typeface="Arial"/>
+            </a:endParaRPr>
+          </a:p>
+          <a:p>
+            <a:pPr marL="342720" indent="-315000">
+              <a:lnSpc>
+                <a:spcPct val="100000"/>
+              </a:lnSpc>
+              <a:tabLst>
+                <a:tab algn="l" pos="0"/>
+              </a:tabLst>
+            </a:pPr>
+            <a:r>
+              <a:rPr b="0" lang="en-US" sz="2400" spc="-1" strike="noStrike">
+                <a:solidFill>
+                  <a:srgbClr val="000000"/>
+                </a:solidFill>
+                <a:latin typeface="Arial"/>
+                <a:ea typeface="DejaVu Sans"/>
+              </a:rPr>
+              <a:t>string</a:t>
+            </a:r>
+            <a:endParaRPr b="0" lang="en-US" sz="2400" spc="-1" strike="noStrike">
+              <a:latin typeface="Arial"/>
+            </a:endParaRPr>
+          </a:p>
+          <a:p>
+            <a:pPr marL="342720" indent="-315000">
+              <a:lnSpc>
+                <a:spcPct val="100000"/>
+              </a:lnSpc>
+              <a:tabLst>
+                <a:tab algn="l" pos="0"/>
+              </a:tabLst>
+            </a:pPr>
+            <a:r>
+              <a:rPr b="0" lang="en-US" sz="2400" spc="-1" strike="noStrike">
+                <a:solidFill>
+                  <a:srgbClr val="000000"/>
+                </a:solidFill>
+                <a:latin typeface="Arial"/>
+                <a:ea typeface="DejaVu Sans"/>
+              </a:rPr>
+              <a:t>file = open("somefile")</a:t>
+            </a:r>
+            <a:endParaRPr b="0" lang="en-US" sz="2400" spc="-1" strike="noStrike">
+              <a:latin typeface="Arial"/>
+            </a:endParaRPr>
+          </a:p>
+          <a:p>
+            <a:pPr marL="342720" indent="-315000">
               <a:lnSpc>
                 <a:spcPct val="100000"/>
               </a:lnSpc>
@@ -15499,7 +15722,7 @@
         <p:spPr>
           <a:xfrm>
             <a:off x="611280" y="259920"/>
-            <a:ext cx="7920720" cy="864360"/>
+            <a:ext cx="7920360" cy="864000"/>
           </a:xfrm>
           <a:prstGeom prst="rect">
             <a:avLst/>
@@ -15584,7 +15807,7 @@
         <p:spPr>
           <a:xfrm>
             <a:off x="611280" y="1371240"/>
-            <a:ext cx="7982640" cy="5395320"/>
+            <a:ext cx="7982280" cy="5394960"/>
           </a:xfrm>
           <a:prstGeom prst="rect">
             <a:avLst/>
@@ -15605,7 +15828,7 @@
             <a:normAutofit fontScale="88000"/>
           </a:bodyPr>
           <a:p>
-            <a:pPr marL="342720" indent="-315360">
+            <a:pPr marL="342720" indent="-315000">
               <a:lnSpc>
                 <a:spcPct val="100000"/>
               </a:lnSpc>
@@ -15661,7 +15884,7 @@
             </a:endParaRPr>
           </a:p>
           <a:p>
-            <a:pPr marL="342720" indent="-315360">
+            <a:pPr marL="342720" indent="-315000">
               <a:lnSpc>
                 <a:spcPct val="100000"/>
               </a:lnSpc>
@@ -15687,7 +15910,7 @@
             </a:endParaRPr>
           </a:p>
           <a:p>
-            <a:pPr marL="342720" indent="-315360">
+            <a:pPr marL="342720" indent="-315000">
               <a:lnSpc>
                 <a:spcPct val="100000"/>
               </a:lnSpc>
@@ -15723,7 +15946,7 @@
             </a:endParaRPr>
           </a:p>
           <a:p>
-            <a:pPr marL="342720" indent="-315360">
+            <a:pPr marL="342720" indent="-315000">
               <a:lnSpc>
                 <a:spcPct val="100000"/>
               </a:lnSpc>
@@ -15749,7 +15972,7 @@
             </a:endParaRPr>
           </a:p>
           <a:p>
-            <a:pPr marL="342720" indent="-315360">
+            <a:pPr marL="342720" indent="-315000">
               <a:lnSpc>
                 <a:spcPct val="100000"/>
               </a:lnSpc>
@@ -15805,7 +16028,7 @@
             </a:endParaRPr>
           </a:p>
           <a:p>
-            <a:pPr marL="342720" indent="-315360">
+            <a:pPr marL="342720" indent="-315000">
               <a:lnSpc>
                 <a:spcPct val="100000"/>
               </a:lnSpc>
@@ -15841,7 +16064,7 @@
             </a:endParaRPr>
           </a:p>
           <a:p>
-            <a:pPr marL="342720" indent="-315360">
+            <a:pPr marL="342720" indent="-315000">
               <a:lnSpc>
                 <a:spcPct val="100000"/>
               </a:lnSpc>
@@ -15897,7 +16120,7 @@
             </a:endParaRPr>
           </a:p>
           <a:p>
-            <a:pPr marL="342720" indent="-315360">
+            <a:pPr marL="342720" indent="-315000">
               <a:lnSpc>
                 <a:spcPct val="100000"/>
               </a:lnSpc>
@@ -15923,7 +16146,7 @@
             </a:endParaRPr>
           </a:p>
           <a:p>
-            <a:pPr marL="342720" indent="-315360">
+            <a:pPr marL="342720" indent="-315000">
               <a:lnSpc>
                 <a:spcPct val="100000"/>
               </a:lnSpc>
@@ -16016,7 +16239,7 @@
         <p:spPr>
           <a:xfrm>
             <a:off x="611280" y="259920"/>
-            <a:ext cx="7911360" cy="855000"/>
+            <a:ext cx="7911000" cy="854640"/>
           </a:xfrm>
           <a:prstGeom prst="rect">
             <a:avLst/>
@@ -16101,7 +16324,7 @@
         <p:spPr>
           <a:xfrm>
             <a:off x="611280" y="1371600"/>
-            <a:ext cx="7911360" cy="4453920"/>
+            <a:ext cx="7911000" cy="4453560"/>
           </a:xfrm>
           <a:prstGeom prst="rect">
             <a:avLst/>
@@ -16122,7 +16345,7 @@
             <a:normAutofit/>
           </a:bodyPr>
           <a:p>
-            <a:pPr marL="342720" indent="-323280">
+            <a:pPr marL="342720" indent="-322920">
               <a:lnSpc>
                 <a:spcPct val="100000"/>
               </a:lnSpc>
@@ -16169,7 +16392,7 @@
             </a:endParaRPr>
           </a:p>
           <a:p>
-            <a:pPr marL="342720" indent="-323280">
+            <a:pPr marL="342720" indent="-322920">
               <a:lnSpc>
                 <a:spcPct val="100000"/>
               </a:lnSpc>
@@ -16185,7 +16408,7 @@
             </a:endParaRPr>
           </a:p>
           <a:p>
-            <a:pPr marL="342720" indent="-323280">
+            <a:pPr marL="342720" indent="-322920">
               <a:lnSpc>
                 <a:spcPct val="100000"/>
               </a:lnSpc>
@@ -16211,7 +16434,7 @@
         <p:spPr>
           <a:xfrm>
             <a:off x="274680" y="1881720"/>
-            <a:ext cx="8593920" cy="4518720"/>
+            <a:ext cx="8593560" cy="4518360"/>
           </a:xfrm>
           <a:custGeom>
             <a:avLst/>
@@ -17197,7 +17420,7 @@
         <p:spPr>
           <a:xfrm>
             <a:off x="611280" y="259920"/>
-            <a:ext cx="7911360" cy="855000"/>
+            <a:ext cx="7911000" cy="854640"/>
           </a:xfrm>
           <a:prstGeom prst="rect">
             <a:avLst/>
@@ -17282,7 +17505,7 @@
         <p:spPr>
           <a:xfrm>
             <a:off x="719280" y="1806480"/>
-            <a:ext cx="3382200" cy="1858320"/>
+            <a:ext cx="3381840" cy="1857960"/>
           </a:xfrm>
           <a:custGeom>
             <a:avLst/>
@@ -17627,7 +17850,7 @@
         <p:spPr>
           <a:xfrm>
             <a:off x="719280" y="4573440"/>
-            <a:ext cx="3382200" cy="1553760"/>
+            <a:ext cx="3381840" cy="1553400"/>
           </a:xfrm>
           <a:custGeom>
             <a:avLst/>
@@ -17918,7 +18141,7 @@
         <p:spPr>
           <a:xfrm>
             <a:off x="4846680" y="1827360"/>
-            <a:ext cx="3382200" cy="1857960"/>
+            <a:ext cx="3381840" cy="1857600"/>
           </a:xfrm>
           <a:custGeom>
             <a:avLst/>
@@ -18209,7 +18432,7 @@
         <p:spPr>
           <a:xfrm>
             <a:off x="4809960" y="4738680"/>
-            <a:ext cx="3382560" cy="1370880"/>
+            <a:ext cx="3382200" cy="1370520"/>
           </a:xfrm>
           <a:custGeom>
             <a:avLst/>
@@ -18446,7 +18669,7 @@
         <p:spPr>
           <a:xfrm>
             <a:off x="4846680" y="1279440"/>
-            <a:ext cx="3291840" cy="455040"/>
+            <a:ext cx="3291480" cy="454680"/>
           </a:xfrm>
           <a:custGeom>
             <a:avLst/>
@@ -18564,7 +18787,7 @@
         <p:spPr>
           <a:xfrm>
             <a:off x="731880" y="1279440"/>
-            <a:ext cx="3291840" cy="455040"/>
+            <a:ext cx="3291480" cy="454680"/>
           </a:xfrm>
           <a:custGeom>
             <a:avLst/>
@@ -18682,9 +18905,9 @@
         <p:grpSpPr>
           <a:xfrm>
             <a:off x="2011320" y="3665520"/>
-            <a:ext cx="453240" cy="910800"/>
+            <a:ext cx="452880" cy="910800"/>
             <a:chOff x="2011320" y="3665520"/>
-            <a:chExt cx="453240" cy="910800"/>
+            <a:chExt cx="452880" cy="910800"/>
           </a:xfrm>
         </p:grpSpPr>
         <p:sp>
@@ -18696,7 +18919,7 @@
           <p:spPr>
             <a:xfrm>
               <a:off x="2011320" y="3665520"/>
-              <a:ext cx="453240" cy="276480"/>
+              <a:ext cx="452880" cy="276120"/>
             </a:xfrm>
             <a:custGeom>
               <a:avLst/>
@@ -18776,9 +18999,9 @@
         <p:grpSpPr>
           <a:xfrm>
             <a:off x="6218280" y="3686040"/>
-            <a:ext cx="453240" cy="1064880"/>
+            <a:ext cx="452880" cy="1064880"/>
             <a:chOff x="6218280" y="3686040"/>
-            <a:chExt cx="453240" cy="1064880"/>
+            <a:chExt cx="452880" cy="1064880"/>
           </a:xfrm>
         </p:grpSpPr>
         <p:sp>
@@ -18790,7 +19013,7 @@
           <p:spPr>
             <a:xfrm>
               <a:off x="6218280" y="3686040"/>
-              <a:ext cx="453240" cy="324000"/>
+              <a:ext cx="452880" cy="323640"/>
             </a:xfrm>
             <a:custGeom>
               <a:avLst/>
@@ -18839,7 +19062,7 @@
           </p:nvSpPr>
           <p:spPr>
             <a:xfrm flipV="1">
-              <a:off x="6465960" y="4010760"/>
+              <a:off x="6465600" y="4010760"/>
               <a:ext cx="0" cy="740160"/>
             </a:xfrm>
             <a:prstGeom prst="line">
@@ -18870,7 +19093,7 @@
         <p:spPr>
           <a:xfrm>
             <a:off x="2286000" y="3946680"/>
-            <a:ext cx="1645560" cy="454680"/>
+            <a:ext cx="1645200" cy="454320"/>
           </a:xfrm>
           <a:custGeom>
             <a:avLst/>
@@ -18978,7 +19201,7 @@
         <p:spPr>
           <a:xfrm>
             <a:off x="6465960" y="4014720"/>
-            <a:ext cx="1645560" cy="455040"/>
+            <a:ext cx="1645200" cy="454680"/>
           </a:xfrm>
           <a:custGeom>
             <a:avLst/>
@@ -19086,7 +19309,7 @@
         <p:spPr>
           <a:xfrm>
             <a:off x="914400" y="6217920"/>
-            <a:ext cx="7131960" cy="487800"/>
+            <a:ext cx="7131600" cy="487440"/>
           </a:xfrm>
           <a:prstGeom prst="rect">
             <a:avLst/>
@@ -19114,25 +19337,41 @@
             </a:pPr>
             <a:r>
               <a:rPr b="1" lang="en-US" sz="2600" spc="-1" strike="noStrike">
+                <a:solidFill>
+                  <a:srgbClr val="000000"/>
+                </a:solidFill>
                 <a:latin typeface="Courier New"/>
+                <a:ea typeface="DejaVu Sans"/>
               </a:rPr>
               <a:t>T</a:t>
             </a:r>
             <a:r>
               <a:rPr b="0" lang="en-US" sz="2600" spc="-1" strike="noStrike">
+                <a:solidFill>
+                  <a:srgbClr val="000000"/>
+                </a:solidFill>
                 <a:latin typeface="Arial"/>
+                <a:ea typeface="DejaVu Sans"/>
               </a:rPr>
               <a:t> is a </a:t>
             </a:r>
             <a:r>
               <a:rPr b="1" i="1" lang="en-US" sz="2600" spc="-1" strike="noStrike">
+                <a:solidFill>
+                  <a:srgbClr val="000000"/>
+                </a:solidFill>
                 <a:latin typeface="Arial"/>
+                <a:ea typeface="DejaVu Sans"/>
               </a:rPr>
               <a:t>type parameter</a:t>
             </a:r>
             <a:r>
               <a:rPr b="1" lang="en-US" sz="2600" spc="-1" strike="noStrike">
+                <a:solidFill>
+                  <a:srgbClr val="000000"/>
+                </a:solidFill>
                 <a:latin typeface="Arial"/>
+                <a:ea typeface="DejaVu Sans"/>
               </a:rPr>
               <a:t>.</a:t>
             </a:r>
@@ -19188,7 +19427,7 @@
         <p:spPr>
           <a:xfrm>
             <a:off x="611280" y="259920"/>
-            <a:ext cx="7895520" cy="839160"/>
+            <a:ext cx="7895160" cy="838800"/>
           </a:xfrm>
           <a:prstGeom prst="rect">
             <a:avLst/>
@@ -19273,7 +19512,7 @@
         <p:spPr>
           <a:xfrm>
             <a:off x="611280" y="1371240"/>
-            <a:ext cx="7895520" cy="4845960"/>
+            <a:ext cx="7895160" cy="4845600"/>
           </a:xfrm>
           <a:prstGeom prst="rect">
             <a:avLst/>
@@ -19294,7 +19533,7 @@
             <a:normAutofit/>
           </a:bodyPr>
           <a:p>
-            <a:pPr marL="342720" indent="-339120">
+            <a:pPr marL="342720" indent="-338760">
               <a:lnSpc>
                 <a:spcPct val="100000"/>
               </a:lnSpc>
@@ -19330,7 +19569,7 @@
             </a:endParaRPr>
           </a:p>
           <a:p>
-            <a:pPr marL="342720" indent="-339120">
+            <a:pPr marL="342720" indent="-338760">
               <a:lnSpc>
                 <a:spcPct val="100000"/>
               </a:lnSpc>
@@ -19346,7 +19585,7 @@
             </a:endParaRPr>
           </a:p>
           <a:p>
-            <a:pPr marL="342720" indent="-339120">
+            <a:pPr marL="342720" indent="-338760">
               <a:lnSpc>
                 <a:spcPct val="100000"/>
               </a:lnSpc>
@@ -19392,7 +19631,7 @@
             </a:endParaRPr>
           </a:p>
           <a:p>
-            <a:pPr marL="342720" indent="-339120">
+            <a:pPr marL="342720" indent="-338760">
               <a:lnSpc>
                 <a:spcPct val="100000"/>
               </a:lnSpc>
@@ -19408,7 +19647,7 @@
             </a:endParaRPr>
           </a:p>
           <a:p>
-            <a:pPr marL="342720" indent="-339120">
+            <a:pPr marL="342720" indent="-338760">
               <a:lnSpc>
                 <a:spcPct val="100000"/>
               </a:lnSpc>
@@ -19464,7 +19703,7 @@
             </a:endParaRPr>
           </a:p>
           <a:p>
-            <a:pPr marL="342720" indent="-339120">
+            <a:pPr marL="342720" indent="-338760">
               <a:lnSpc>
                 <a:spcPct val="100000"/>
               </a:lnSpc>
@@ -19480,7 +19719,7 @@
             </a:endParaRPr>
           </a:p>
           <a:p>
-            <a:pPr marL="342720" indent="-339120">
+            <a:pPr marL="342720" indent="-338760">
               <a:lnSpc>
                 <a:spcPct val="100000"/>
               </a:lnSpc>
@@ -19506,7 +19745,7 @@
         <p:spPr>
           <a:xfrm>
             <a:off x="548640" y="4019400"/>
-            <a:ext cx="7772040" cy="2561760"/>
+            <a:ext cx="7771680" cy="2747160"/>
           </a:xfrm>
           <a:prstGeom prst="rect">
             <a:avLst/>
@@ -19529,7 +19768,7 @@
             <a:noAutofit/>
           </a:bodyPr>
           <a:p>
-            <a:pPr marL="342720" indent="-339120">
+            <a:pPr marL="342720" indent="-338760">
               <a:lnSpc>
                 <a:spcPct val="100000"/>
               </a:lnSpc>
@@ -19546,6 +19785,7 @@
                   <a:srgbClr val="000000"/>
                 </a:solidFill>
                 <a:latin typeface="Courier New"/>
+                <a:ea typeface="DejaVu Sans"/>
               </a:rPr>
               <a:t>from collections.abc import ABC, abstractmethod</a:t>
             </a:r>
@@ -19554,7 +19794,7 @@
             </a:endParaRPr>
           </a:p>
           <a:p>
-            <a:pPr marL="342720" indent="-339120">
+            <a:pPr marL="342720" indent="-338760">
               <a:lnSpc>
                 <a:spcPct val="100000"/>
               </a:lnSpc>
@@ -19571,6 +19811,7 @@
                   <a:srgbClr val="000000"/>
                 </a:solidFill>
                 <a:latin typeface="Courier New"/>
+                <a:ea typeface="DejaVu Sans"/>
               </a:rPr>
               <a:t>class Iterator(ABC):</a:t>
             </a:r>
@@ -19579,7 +19820,7 @@
             </a:endParaRPr>
           </a:p>
           <a:p>
-            <a:pPr marL="342720" indent="-339120">
+            <a:pPr marL="342720" indent="-338760">
               <a:lnSpc>
                 <a:spcPct val="100000"/>
               </a:lnSpc>
@@ -19595,7 +19836,7 @@
             </a:endParaRPr>
           </a:p>
           <a:p>
-            <a:pPr marL="342720" indent="-339120">
+            <a:pPr marL="342720" indent="-338760">
               <a:lnSpc>
                 <a:spcPct val="100000"/>
               </a:lnSpc>
@@ -19612,6 +19853,7 @@
                   <a:srgbClr val="000000"/>
                 </a:solidFill>
                 <a:latin typeface="Courier New"/>
+                <a:ea typeface="DejaVu Sans"/>
               </a:rPr>
               <a:t>    </a:t>
             </a:r>
@@ -19621,6 +19863,7 @@
                   <a:srgbClr val="000000"/>
                 </a:solidFill>
                 <a:latin typeface="Courier New"/>
+                <a:ea typeface="DejaVu Sans"/>
               </a:rPr>
               <a:t>@abstractmethod</a:t>
             </a:r>
@@ -19629,7 +19872,7 @@
             </a:endParaRPr>
           </a:p>
           <a:p>
-            <a:pPr marL="342720" indent="-339120">
+            <a:pPr marL="342720" indent="-338760">
               <a:lnSpc>
                 <a:spcPct val="100000"/>
               </a:lnSpc>
@@ -19646,6 +19889,7 @@
                   <a:srgbClr val="000000"/>
                 </a:solidFill>
                 <a:latin typeface="Courier New"/>
+                <a:ea typeface="DejaVu Sans"/>
               </a:rPr>
               <a:t>    </a:t>
             </a:r>
@@ -19655,6 +19899,7 @@
                   <a:srgbClr val="000000"/>
                 </a:solidFill>
                 <a:latin typeface="Courier New"/>
+                <a:ea typeface="DejaVu Sans"/>
               </a:rPr>
               <a:t>def __next__(self):</a:t>
             </a:r>
@@ -19663,7 +19908,7 @@
             </a:endParaRPr>
           </a:p>
           <a:p>
-            <a:pPr marL="342720" indent="-339120">
+            <a:pPr marL="342720" indent="-338760">
               <a:lnSpc>
                 <a:spcPct val="100000"/>
               </a:lnSpc>
@@ -19680,6 +19925,7 @@
                   <a:srgbClr val="000000"/>
                 </a:solidFill>
                 <a:latin typeface="Courier New"/>
+                <a:ea typeface="DejaVu Sans"/>
               </a:rPr>
               <a:t>        </a:t>
             </a:r>
@@ -19689,6 +19935,7 @@
                   <a:srgbClr val="008000"/>
                 </a:solidFill>
                 <a:latin typeface="Courier New"/>
+                <a:ea typeface="DejaVu Sans"/>
               </a:rPr>
               <a:t>"""Return the next element."""</a:t>
             </a:r>
@@ -19697,7 +19944,7 @@
             </a:endParaRPr>
           </a:p>
           <a:p>
-            <a:pPr marL="342720" indent="-339120">
+            <a:pPr marL="342720" indent="-338760">
               <a:lnSpc>
                 <a:spcPct val="100000"/>
               </a:lnSpc>
@@ -19714,6 +19961,7 @@
                   <a:srgbClr val="000000"/>
                 </a:solidFill>
                 <a:latin typeface="Courier New"/>
+                <a:ea typeface="DejaVu Sans"/>
               </a:rPr>
               <a:t>        </a:t>
             </a:r>
@@ -19723,6 +19971,7 @@
                   <a:srgbClr val="000000"/>
                 </a:solidFill>
                 <a:latin typeface="Courier New"/>
+                <a:ea typeface="DejaVu Sans"/>
               </a:rPr>
               <a:t>pass</a:t>
             </a:r>
@@ -19778,7 +20027,7 @@
         <p:spPr>
           <a:xfrm>
             <a:off x="611280" y="259920"/>
-            <a:ext cx="7895520" cy="839160"/>
+            <a:ext cx="7895160" cy="838800"/>
           </a:xfrm>
           <a:prstGeom prst="rect">
             <a:avLst/>
@@ -19863,7 +20112,7 @@
         <p:spPr>
           <a:xfrm>
             <a:off x="611280" y="1371600"/>
-            <a:ext cx="7895520" cy="4438080"/>
+            <a:ext cx="7895160" cy="4437720"/>
           </a:xfrm>
           <a:prstGeom prst="rect">
             <a:avLst/>
@@ -19884,7 +20133,7 @@
             <a:normAutofit/>
           </a:bodyPr>
           <a:p>
-            <a:pPr marL="342720" indent="-339120">
+            <a:pPr marL="342720" indent="-338760">
               <a:lnSpc>
                 <a:spcPct val="100000"/>
               </a:lnSpc>
@@ -19920,7 +20169,7 @@
             </a:endParaRPr>
           </a:p>
           <a:p>
-            <a:pPr marL="342720" indent="-339120">
+            <a:pPr marL="342720" indent="-338760">
               <a:lnSpc>
                 <a:spcPct val="100000"/>
               </a:lnSpc>
@@ -19936,7 +20185,7 @@
             </a:endParaRPr>
           </a:p>
           <a:p>
-            <a:pPr marL="342720" indent="-339120">
+            <a:pPr marL="342720" indent="-338760">
               <a:lnSpc>
                 <a:spcPct val="100000"/>
               </a:lnSpc>
@@ -19972,7 +20221,7 @@
             </a:endParaRPr>
           </a:p>
           <a:p>
-            <a:pPr marL="342720" indent="-339120">
+            <a:pPr marL="342720" indent="-338760">
               <a:lnSpc>
                 <a:spcPct val="100000"/>
               </a:lnSpc>
@@ -20009,7 +20258,7 @@
             </a:endParaRPr>
           </a:p>
           <a:p>
-            <a:pPr marL="342720" indent="-339120">
+            <a:pPr marL="342720" indent="-338760">
               <a:lnSpc>
                 <a:spcPct val="100000"/>
               </a:lnSpc>
@@ -20025,7 +20274,7 @@
             </a:endParaRPr>
           </a:p>
           <a:p>
-            <a:pPr marL="342720" indent="-339120">
+            <a:pPr marL="342720" indent="-338760">
               <a:lnSpc>
                 <a:spcPct val="100000"/>
               </a:lnSpc>
@@ -20044,14 +20293,14 @@
                 <a:latin typeface="Arial"/>
                 <a:ea typeface="DejaVu Sans"/>
               </a:rPr>
-              <a:t>Example: an Appointments class provides iterators</a:t>
+              <a:t>Example: an Appointments class is an Iterator</a:t>
             </a:r>
             <a:endParaRPr b="0" lang="en-US" sz="2400" spc="-1" strike="noStrike">
               <a:latin typeface="Arial"/>
             </a:endParaRPr>
           </a:p>
           <a:p>
-            <a:pPr marL="342720" indent="-339120">
+            <a:pPr marL="342720" indent="-338760">
               <a:lnSpc>
                 <a:spcPct val="100000"/>
               </a:lnSpc>
@@ -20067,7 +20316,7 @@
             </a:endParaRPr>
           </a:p>
           <a:p>
-            <a:pPr marL="342720" indent="-339120">
+            <a:pPr marL="342720" indent="-338760">
               <a:lnSpc>
                 <a:spcPct val="100000"/>
               </a:lnSpc>
@@ -20140,7 +20389,7 @@
         <p:spPr>
           <a:xfrm>
             <a:off x="611280" y="259920"/>
-            <a:ext cx="7911360" cy="855000"/>
+            <a:ext cx="7911000" cy="854640"/>
           </a:xfrm>
           <a:prstGeom prst="rect">
             <a:avLst/>
@@ -20225,7 +20474,7 @@
         <p:spPr>
           <a:xfrm>
             <a:off x="611280" y="1371240"/>
-            <a:ext cx="7911360" cy="3839400"/>
+            <a:ext cx="7911000" cy="3839040"/>
           </a:xfrm>
           <a:prstGeom prst="rect">
             <a:avLst/>
@@ -20246,7 +20495,7 @@
             <a:normAutofit/>
           </a:bodyPr>
           <a:p>
-            <a:pPr marL="342720" indent="-323280">
+            <a:pPr marL="342720" indent="-322920">
               <a:lnSpc>
                 <a:spcPct val="100000"/>
               </a:lnSpc>
@@ -20272,7 +20521,7 @@
             </a:endParaRPr>
           </a:p>
           <a:p>
-            <a:pPr marL="342720" indent="-323280">
+            <a:pPr marL="342720" indent="-322920">
               <a:lnSpc>
                 <a:spcPct val="100000"/>
               </a:lnSpc>
@@ -20348,7 +20597,7 @@
             </a:endParaRPr>
           </a:p>
           <a:p>
-            <a:pPr marL="342720" indent="-323280">
+            <a:pPr marL="342720" indent="-322920">
               <a:lnSpc>
                 <a:spcPct val="100000"/>
               </a:lnSpc>
@@ -20364,7 +20613,7 @@
             </a:endParaRPr>
           </a:p>
           <a:p>
-            <a:pPr marL="342720" indent="-323280">
+            <a:pPr marL="342720" indent="-322920">
               <a:lnSpc>
                 <a:spcPct val="100000"/>
               </a:lnSpc>
@@ -20390,7 +20639,7 @@
             </a:endParaRPr>
           </a:p>
           <a:p>
-            <a:pPr marL="342720" indent="-323280">
+            <a:pPr marL="342720" indent="-322920">
               <a:lnSpc>
                 <a:spcPct val="100000"/>
               </a:lnSpc>
@@ -20507,7 +20756,7 @@
             </a:endParaRPr>
           </a:p>
           <a:p>
-            <a:pPr marL="342720" indent="-323280">
+            <a:pPr marL="342720" indent="-322920">
               <a:lnSpc>
                 <a:spcPct val="100000"/>
               </a:lnSpc>
@@ -20523,7 +20772,7 @@
             </a:endParaRPr>
           </a:p>
           <a:p>
-            <a:pPr marL="342720" indent="-323280">
+            <a:pPr marL="342720" indent="-322920">
               <a:lnSpc>
                 <a:spcPct val="100000"/>
               </a:lnSpc>
@@ -20586,7 +20835,7 @@
         <p:spPr>
           <a:xfrm>
             <a:off x="611280" y="259920"/>
-            <a:ext cx="7911360" cy="855000"/>
+            <a:ext cx="7911000" cy="854640"/>
           </a:xfrm>
           <a:prstGeom prst="rect">
             <a:avLst/>
@@ -20671,7 +20920,7 @@
         <p:spPr>
           <a:xfrm>
             <a:off x="611280" y="1371600"/>
-            <a:ext cx="7911360" cy="4453920"/>
+            <a:ext cx="7911000" cy="4453560"/>
           </a:xfrm>
           <a:prstGeom prst="rect">
             <a:avLst/>
@@ -20692,7 +20941,7 @@
             <a:normAutofit/>
           </a:bodyPr>
           <a:p>
-            <a:pPr marL="342720" indent="-323280">
+            <a:pPr marL="342720" indent="-322920">
               <a:lnSpc>
                 <a:spcPct val="100000"/>
               </a:lnSpc>
@@ -20738,7 +20987,7 @@
             </a:endParaRPr>
           </a:p>
           <a:p>
-            <a:pPr marL="342720" indent="-323280">
+            <a:pPr marL="342720" indent="-322920">
               <a:lnSpc>
                 <a:spcPct val="100000"/>
               </a:lnSpc>
@@ -20754,7 +21003,7 @@
             </a:endParaRPr>
           </a:p>
           <a:p>
-            <a:pPr marL="342720" indent="-323280">
+            <a:pPr marL="342720" indent="-322920">
               <a:lnSpc>
                 <a:spcPct val="100000"/>
               </a:lnSpc>
@@ -20780,7 +21029,7 @@
         <p:spPr>
           <a:xfrm>
             <a:off x="274680" y="1881720"/>
-            <a:ext cx="8593920" cy="2507040"/>
+            <a:ext cx="8593560" cy="2506680"/>
           </a:xfrm>
           <a:custGeom>
             <a:avLst/>
@@ -21409,7 +21658,7 @@
         <p:spPr>
           <a:xfrm>
             <a:off x="457200" y="4846320"/>
-            <a:ext cx="8320680" cy="969120"/>
+            <a:ext cx="8320320" cy="968760"/>
           </a:xfrm>
           <a:prstGeom prst="rect">
             <a:avLst/>
@@ -21437,31 +21686,51 @@
             </a:pPr>
             <a:r>
               <a:rPr b="0" lang="en-US" sz="2400" spc="-1" strike="noStrike">
+                <a:solidFill>
+                  <a:srgbClr val="000000"/>
+                </a:solidFill>
                 <a:latin typeface="Arial"/>
+                <a:ea typeface="DejaVu Sans"/>
               </a:rPr>
               <a:t>You should write </a:t>
             </a:r>
             <a:r>
               <a:rPr b="0" lang="en-US" sz="2400" spc="-1" strike="noStrike">
+                <a:solidFill>
+                  <a:srgbClr val="000000"/>
+                </a:solidFill>
                 <a:latin typeface="Courier New"/>
+                <a:ea typeface="DejaVu Sans"/>
               </a:rPr>
               <a:t>iter(fruit)</a:t>
             </a:r>
             <a:r>
               <a:rPr b="0" lang="en-US" sz="2400" spc="-1" strike="noStrike">
+                <a:solidFill>
+                  <a:srgbClr val="000000"/>
+                </a:solidFill>
                 <a:latin typeface="Arial"/>
+                <a:ea typeface="DejaVu Sans"/>
               </a:rPr>
               <a:t>, not </a:t>
             </a:r>
             <a:r>
               <a:rPr b="0" lang="en-US" sz="2400" spc="-1" strike="noStrike">
+                <a:solidFill>
+                  <a:srgbClr val="000000"/>
+                </a:solidFill>
                 <a:latin typeface="Courier New"/>
+                <a:ea typeface="DejaVu Sans"/>
               </a:rPr>
               <a:t>fruit.__iter__()</a:t>
             </a:r>
             <a:r>
               <a:rPr b="0" lang="en-US" sz="2400" spc="-1" strike="noStrike">
+                <a:solidFill>
+                  <a:srgbClr val="000000"/>
+                </a:solidFill>
                 <a:latin typeface="Arial"/>
+                <a:ea typeface="DejaVu Sans"/>
               </a:rPr>
               <a:t>.</a:t>
             </a:r>

</xml_diff>